<commit_message>
Adding new slide layout.
</commit_message>
<xml_diff>
--- a/assets/slides/templates/DeepRob_Paper_Presentation.pptx
+++ b/assets/slides/templates/DeepRob_Paper_Presentation.pptx
@@ -346,7 +346,7 @@
       </p:grpSpPr>
       <p:sp>
         <p:nvSpPr>
-          <p:cNvPr id="60" name="Shape 60"/>
+          <p:cNvPr id="64" name="Shape 64"/>
           <p:cNvSpPr/>
           <p:nvPr>
             <p:ph type="sldImg"/>
@@ -371,7 +371,7 @@
       </p:sp>
       <p:sp>
         <p:nvSpPr>
-          <p:cNvPr id="61" name="Shape 61"/>
+          <p:cNvPr id="65" name="Shape 65"/>
           <p:cNvSpPr/>
           <p:nvPr>
             <p:ph type="body" sz="quarter" idx="1"/>
@@ -520,7 +520,7 @@
       </p:grpSpPr>
       <p:sp>
         <p:nvSpPr>
-          <p:cNvPr id="16" name="Slide Number"/>
+          <p:cNvPr id="17" name="Slide Number"/>
           <p:cNvSpPr txBox="1"/>
           <p:nvPr>
             <p:ph type="sldNum" sz="quarter" idx="2"/>
@@ -542,7 +542,7 @@
       </p:sp>
       <p:sp>
         <p:nvSpPr>
-          <p:cNvPr id="17" name="University of Michigan and University of Minnesota">
+          <p:cNvPr id="18" name="University of Michigan | Department of Robotics">
             <a:hlinkClick r:id="rId2" invalidUrl="" action="" tgtFrame="" tooltip="" history="1" highlightClick="0" endSnd="0"/>
           </p:cNvPr>
           <p:cNvSpPr txBox="1"/>
@@ -566,7 +566,7 @@
           <a:bodyPr lIns="50800" tIns="50800" rIns="50800" bIns="50800" anchor="ctr"/>
           <a:lstStyle/>
           <a:p>
-            <a:pPr marL="0" indent="0" defTabSz="2365188">
+            <a:pPr marL="0" indent="0" defTabSz="2413955">
               <a:spcBef>
                 <a:spcPts val="0"/>
               </a:spcBef>
@@ -574,7 +574,7 @@
               <a:buSzTx/>
               <a:buFontTx/>
               <a:buNone/>
-              <a:defRPr b="1" spc="-77" sz="3880">
+              <a:defRPr b="1" spc="-79" sz="3959">
                 <a:latin typeface="Exo 2"/>
                 <a:ea typeface="Exo 2"/>
                 <a:cs typeface="Exo 2"/>
@@ -583,7 +583,7 @@
             </a:pPr>
           </a:p>
           <a:p>
-            <a:pPr marL="0" indent="0" defTabSz="2365188">
+            <a:pPr marL="0" indent="0" defTabSz="2413955">
               <a:spcBef>
                 <a:spcPts val="0"/>
               </a:spcBef>
@@ -591,7 +591,7 @@
               <a:buSzTx/>
               <a:buFontTx/>
               <a:buNone/>
-              <a:defRPr b="1" spc="-77" sz="3880">
+              <a:defRPr b="1" spc="-79" sz="3959">
                 <a:latin typeface="Exo 2"/>
                 <a:ea typeface="Exo 2"/>
                 <a:cs typeface="Exo 2"/>
@@ -600,7 +600,7 @@
             </a:pPr>
           </a:p>
           <a:p>
-            <a:pPr marL="0" indent="0" defTabSz="2365188">
+            <a:pPr marL="0" indent="0" defTabSz="2413955">
               <a:spcBef>
                 <a:spcPts val="0"/>
               </a:spcBef>
@@ -608,7 +608,7 @@
               <a:buSzTx/>
               <a:buFontTx/>
               <a:buNone/>
-              <a:defRPr b="1" spc="-77" sz="3880">
+              <a:defRPr b="1" spc="-79" sz="3959">
                 <a:latin typeface="Exo 2"/>
                 <a:ea typeface="Exo 2"/>
                 <a:cs typeface="Exo 2"/>
@@ -616,7 +616,7 @@
               </a:defRPr>
             </a:pPr>
             <a:r>
-              <a:t>University of Michigan and University of Minnesota</a:t>
+              <a:t>University of Michigan | Department of Robotics</a:t>
             </a:r>
           </a:p>
         </p:txBody>
@@ -649,7 +649,7 @@
       </p:grpSpPr>
       <p:sp>
         <p:nvSpPr>
-          <p:cNvPr id="24" name="Slide Number"/>
+          <p:cNvPr id="25" name="Slide Number"/>
           <p:cNvSpPr txBox="1"/>
           <p:nvPr>
             <p:ph type="sldNum" sz="quarter" idx="2"/>
@@ -671,7 +671,7 @@
       </p:sp>
       <p:sp>
         <p:nvSpPr>
-          <p:cNvPr id="25" name="Section"/>
+          <p:cNvPr id="26" name="Section"/>
           <p:cNvSpPr txBox="1"/>
           <p:nvPr>
             <p:ph type="body" sz="half" idx="21" hasCustomPrompt="1"/>
@@ -716,68 +716,9 @@
           </a:p>
         </p:txBody>
       </p:sp>
-      <p:pic>
-        <p:nvPicPr>
-          <p:cNvPr id="26" name="Minn.png" descr="Minn.png"/>
-          <p:cNvPicPr>
-            <a:picLocks noChangeAspect="1"/>
-          </p:cNvPicPr>
-          <p:nvPr/>
-        </p:nvPicPr>
-        <p:blipFill>
-          <a:blip r:embed="rId2">
-            <a:extLst/>
-          </a:blip>
-          <a:srcRect l="29750" t="0" r="29750" b="60440"/>
-          <a:stretch>
-            <a:fillRect/>
-          </a:stretch>
-        </p:blipFill>
-        <p:spPr>
-          <a:xfrm>
-            <a:off x="2147907" y="12340118"/>
-            <a:ext cx="1686858" cy="1006419"/>
-          </a:xfrm>
-          <a:prstGeom prst="rect">
-            <a:avLst/>
-          </a:prstGeom>
-          <a:ln w="12700">
-            <a:miter lim="400000"/>
-          </a:ln>
-        </p:spPr>
-      </p:pic>
-      <p:pic>
-        <p:nvPicPr>
-          <p:cNvPr id="27" name="Image" descr="Image"/>
-          <p:cNvPicPr>
-            <a:picLocks noChangeAspect="1"/>
-          </p:cNvPicPr>
-          <p:nvPr/>
-        </p:nvPicPr>
-        <p:blipFill>
-          <a:blip r:embed="rId3">
-            <a:extLst/>
-          </a:blip>
-          <a:stretch>
-            <a:fillRect/>
-          </a:stretch>
-        </p:blipFill>
-        <p:spPr>
-          <a:xfrm>
-            <a:off x="211840" y="12340198"/>
-            <a:ext cx="1407630" cy="1006317"/>
-          </a:xfrm>
-          <a:prstGeom prst="rect">
-            <a:avLst/>
-          </a:prstGeom>
-          <a:ln w="12700">
-            <a:miter lim="400000"/>
-          </a:ln>
-        </p:spPr>
-      </p:pic>
       <p:sp>
         <p:nvSpPr>
-          <p:cNvPr id="28" name="Subsection"/>
+          <p:cNvPr id="27" name="Subsection"/>
           <p:cNvSpPr txBox="1"/>
           <p:nvPr>
             <p:ph type="body" sz="quarter" idx="22" hasCustomPrompt="1"/>
@@ -824,7 +765,94 @@
       </p:sp>
       <p:pic>
         <p:nvPicPr>
-          <p:cNvPr id="29" name="favicon.png" descr="favicon.png"/>
+          <p:cNvPr id="28" name="DeepRob.pdf" descr="DeepRob.pdf"/>
+          <p:cNvPicPr>
+            <a:picLocks noChangeAspect="1"/>
+          </p:cNvPicPr>
+          <p:nvPr/>
+        </p:nvPicPr>
+        <p:blipFill>
+          <a:blip r:embed="rId2">
+            <a:extLst/>
+          </a:blip>
+          <a:stretch>
+            <a:fillRect/>
+          </a:stretch>
+        </p:blipFill>
+        <p:spPr>
+          <a:xfrm>
+            <a:off x="2168653" y="12602033"/>
+            <a:ext cx="3802215" cy="1079927"/>
+          </a:xfrm>
+          <a:prstGeom prst="rect">
+            <a:avLst/>
+          </a:prstGeom>
+          <a:ln w="12700">
+            <a:miter lim="400000"/>
+          </a:ln>
+        </p:spPr>
+      </p:pic>
+      <p:pic>
+        <p:nvPicPr>
+          <p:cNvPr id="29" name="Image" descr="Image"/>
+          <p:cNvPicPr>
+            <a:picLocks noChangeAspect="1"/>
+          </p:cNvPicPr>
+          <p:nvPr/>
+        </p:nvPicPr>
+        <p:blipFill>
+          <a:blip r:embed="rId3">
+            <a:extLst/>
+          </a:blip>
+          <a:stretch>
+            <a:fillRect/>
+          </a:stretch>
+        </p:blipFill>
+        <p:spPr>
+          <a:xfrm>
+            <a:off x="211840" y="12340198"/>
+            <a:ext cx="1407630" cy="1006317"/>
+          </a:xfrm>
+          <a:prstGeom prst="rect">
+            <a:avLst/>
+          </a:prstGeom>
+          <a:ln w="12700">
+            <a:miter lim="400000"/>
+          </a:ln>
+        </p:spPr>
+      </p:pic>
+      <p:sp>
+        <p:nvSpPr>
+          <p:cNvPr id="30" name="Line"/>
+          <p:cNvSpPr/>
+          <p:nvPr/>
+        </p:nvSpPr>
+        <p:spPr>
+          <a:xfrm flipV="1">
+            <a:off x="1891529" y="12395761"/>
+            <a:ext cx="5066" cy="895191"/>
+          </a:xfrm>
+          <a:prstGeom prst="line">
+            <a:avLst/>
+          </a:prstGeom>
+          <a:ln w="25400">
+            <a:solidFill>
+              <a:srgbClr val="00274C"/>
+            </a:solidFill>
+            <a:miter lim="400000"/>
+          </a:ln>
+        </p:spPr>
+        <p:txBody>
+          <a:bodyPr lIns="50800" tIns="50800" rIns="50800" bIns="50800" anchor="ctr"/>
+          <a:lstStyle/>
+          <a:p>
+            <a:pPr/>
+          </a:p>
+        </p:txBody>
+      </p:sp>
+      <p:pic>
+        <p:nvPicPr>
+          <p:cNvPr id="31" name="UMich_favicon_light.png" descr="UMich_favicon_light.png"/>
           <p:cNvPicPr>
             <a:picLocks noChangeAspect="1"/>
           </p:cNvPicPr>
@@ -840,8 +868,8 @@
         </p:blipFill>
         <p:spPr>
           <a:xfrm>
-            <a:off x="195870" y="171403"/>
-            <a:ext cx="1439571" cy="1439572"/>
+            <a:off x="204455" y="179936"/>
+            <a:ext cx="1422401" cy="1422401"/>
           </a:xfrm>
           <a:prstGeom prst="rect">
             <a:avLst/>
@@ -879,7 +907,7 @@
       </p:grpSpPr>
       <p:sp>
         <p:nvSpPr>
-          <p:cNvPr id="36" name="Google Shape;21;p9"/>
+          <p:cNvPr id="38" name="Google Shape;21;p9"/>
           <p:cNvSpPr/>
           <p:nvPr/>
         </p:nvSpPr>
@@ -917,7 +945,7 @@
       </p:sp>
       <p:sp>
         <p:nvSpPr>
-          <p:cNvPr id="37" name="Title Text"/>
+          <p:cNvPr id="39" name="Title Text"/>
           <p:cNvSpPr txBox="1"/>
           <p:nvPr>
             <p:ph type="title"/>
@@ -941,7 +969,7 @@
       </p:sp>
       <p:sp>
         <p:nvSpPr>
-          <p:cNvPr id="38" name="Body Level One…"/>
+          <p:cNvPr id="40" name="Body Level One…"/>
           <p:cNvSpPr txBox="1"/>
           <p:nvPr>
             <p:ph type="body" idx="1"/>
@@ -989,7 +1017,7 @@
       </p:sp>
       <p:sp>
         <p:nvSpPr>
-          <p:cNvPr id="39" name="Slide Number"/>
+          <p:cNvPr id="41" name="Slide Number"/>
           <p:cNvSpPr txBox="1"/>
           <p:nvPr>
             <p:ph type="sldNum" sz="quarter" idx="2"/>
@@ -1011,7 +1039,7 @@
       </p:sp>
       <p:pic>
         <p:nvPicPr>
-          <p:cNvPr id="40" name="Minn.png" descr="Minn.png"/>
+          <p:cNvPr id="42" name="DeepRob.pdf" descr="DeepRob.pdf"/>
           <p:cNvPicPr>
             <a:picLocks noChangeAspect="1"/>
           </p:cNvPicPr>
@@ -1021,15 +1049,14 @@
           <a:blip r:embed="rId2">
             <a:extLst/>
           </a:blip>
-          <a:srcRect l="29750" t="0" r="29750" b="60440"/>
           <a:stretch>
             <a:fillRect/>
           </a:stretch>
         </p:blipFill>
         <p:spPr>
           <a:xfrm>
-            <a:off x="2147907" y="12340118"/>
-            <a:ext cx="1686858" cy="1006419"/>
+            <a:off x="2168653" y="12602033"/>
+            <a:ext cx="3802215" cy="1079927"/>
           </a:xfrm>
           <a:prstGeom prst="rect">
             <a:avLst/>
@@ -1041,7 +1068,7 @@
       </p:pic>
       <p:pic>
         <p:nvPicPr>
-          <p:cNvPr id="41" name="Image" descr="Image"/>
+          <p:cNvPr id="43" name="Image" descr="Image"/>
           <p:cNvPicPr>
             <a:picLocks noChangeAspect="1"/>
           </p:cNvPicPr>
@@ -1068,9 +1095,38 @@
           </a:ln>
         </p:spPr>
       </p:pic>
+      <p:sp>
+        <p:nvSpPr>
+          <p:cNvPr id="44" name="Line"/>
+          <p:cNvSpPr/>
+          <p:nvPr/>
+        </p:nvSpPr>
+        <p:spPr>
+          <a:xfrm flipV="1">
+            <a:off x="1891529" y="12395761"/>
+            <a:ext cx="5066" cy="895191"/>
+          </a:xfrm>
+          <a:prstGeom prst="line">
+            <a:avLst/>
+          </a:prstGeom>
+          <a:ln w="25400">
+            <a:solidFill>
+              <a:srgbClr val="00274C"/>
+            </a:solidFill>
+            <a:miter lim="400000"/>
+          </a:ln>
+        </p:spPr>
+        <p:txBody>
+          <a:bodyPr lIns="50800" tIns="50800" rIns="50800" bIns="50800" anchor="ctr"/>
+          <a:lstStyle/>
+          <a:p>
+            <a:pPr/>
+          </a:p>
+        </p:txBody>
+      </p:sp>
       <p:pic>
         <p:nvPicPr>
-          <p:cNvPr id="42" name="favicon.png" descr="favicon.png"/>
+          <p:cNvPr id="45" name="UMich_favicon_light.png" descr="UMich_favicon_light.png"/>
           <p:cNvPicPr>
             <a:picLocks noChangeAspect="1"/>
           </p:cNvPicPr>
@@ -1086,8 +1142,8 @@
         </p:blipFill>
         <p:spPr>
           <a:xfrm>
-            <a:off x="195870" y="171403"/>
-            <a:ext cx="1439571" cy="1439572"/>
+            <a:off x="204455" y="179936"/>
+            <a:ext cx="1422401" cy="1422401"/>
           </a:xfrm>
           <a:prstGeom prst="rect">
             <a:avLst/>
@@ -1125,7 +1181,7 @@
       </p:grpSpPr>
       <p:sp>
         <p:nvSpPr>
-          <p:cNvPr id="49" name="Google Shape;21;p9"/>
+          <p:cNvPr id="52" name="Google Shape;21;p9"/>
           <p:cNvSpPr/>
           <p:nvPr/>
         </p:nvSpPr>
@@ -1163,7 +1219,7 @@
       </p:sp>
       <p:sp>
         <p:nvSpPr>
-          <p:cNvPr id="50" name="Title Text"/>
+          <p:cNvPr id="53" name="Title Text"/>
           <p:cNvSpPr txBox="1"/>
           <p:nvPr>
             <p:ph type="title"/>
@@ -1187,7 +1243,7 @@
       </p:sp>
       <p:sp>
         <p:nvSpPr>
-          <p:cNvPr id="51" name="Slide Number"/>
+          <p:cNvPr id="54" name="Slide Number"/>
           <p:cNvSpPr txBox="1"/>
           <p:nvPr>
             <p:ph type="sldNum" sz="quarter" idx="2"/>
@@ -1209,7 +1265,7 @@
       </p:sp>
       <p:pic>
         <p:nvPicPr>
-          <p:cNvPr id="52" name="Minn.png" descr="Minn.png"/>
+          <p:cNvPr id="55" name="DeepRob.pdf" descr="DeepRob.pdf"/>
           <p:cNvPicPr>
             <a:picLocks noChangeAspect="1"/>
           </p:cNvPicPr>
@@ -1219,15 +1275,14 @@
           <a:blip r:embed="rId2">
             <a:extLst/>
           </a:blip>
-          <a:srcRect l="29750" t="0" r="29750" b="60440"/>
           <a:stretch>
             <a:fillRect/>
           </a:stretch>
         </p:blipFill>
         <p:spPr>
           <a:xfrm>
-            <a:off x="2147907" y="12340118"/>
-            <a:ext cx="1686858" cy="1006419"/>
+            <a:off x="2168653" y="12602033"/>
+            <a:ext cx="3802215" cy="1079927"/>
           </a:xfrm>
           <a:prstGeom prst="rect">
             <a:avLst/>
@@ -1239,7 +1294,7 @@
       </p:pic>
       <p:pic>
         <p:nvPicPr>
-          <p:cNvPr id="53" name="Image" descr="Image"/>
+          <p:cNvPr id="56" name="Image" descr="Image"/>
           <p:cNvPicPr>
             <a:picLocks noChangeAspect="1"/>
           </p:cNvPicPr>
@@ -1266,9 +1321,38 @@
           </a:ln>
         </p:spPr>
       </p:pic>
+      <p:sp>
+        <p:nvSpPr>
+          <p:cNvPr id="57" name="Line"/>
+          <p:cNvSpPr/>
+          <p:nvPr/>
+        </p:nvSpPr>
+        <p:spPr>
+          <a:xfrm flipV="1">
+            <a:off x="1891529" y="12395761"/>
+            <a:ext cx="5066" cy="895191"/>
+          </a:xfrm>
+          <a:prstGeom prst="line">
+            <a:avLst/>
+          </a:prstGeom>
+          <a:ln w="25400">
+            <a:solidFill>
+              <a:srgbClr val="00274C"/>
+            </a:solidFill>
+            <a:miter lim="400000"/>
+          </a:ln>
+        </p:spPr>
+        <p:txBody>
+          <a:bodyPr lIns="50800" tIns="50800" rIns="50800" bIns="50800" anchor="ctr"/>
+          <a:lstStyle/>
+          <a:p>
+            <a:pPr/>
+          </a:p>
+        </p:txBody>
+      </p:sp>
       <p:pic>
         <p:nvPicPr>
-          <p:cNvPr id="54" name="favicon.png" descr="favicon.png"/>
+          <p:cNvPr id="58" name="UMich_favicon_light.png" descr="UMich_favicon_light.png"/>
           <p:cNvPicPr>
             <a:picLocks noChangeAspect="1"/>
           </p:cNvPicPr>
@@ -1284,8 +1368,8 @@
         </p:blipFill>
         <p:spPr>
           <a:xfrm>
-            <a:off x="195870" y="171403"/>
-            <a:ext cx="1439571" cy="1439572"/>
+            <a:off x="204455" y="179936"/>
+            <a:ext cx="1422401" cy="1422401"/>
           </a:xfrm>
           <a:prstGeom prst="rect">
             <a:avLst/>
@@ -1328,9 +1412,67 @@
           <a:chExt cx="0" cy="0"/>
         </a:xfrm>
       </p:grpSpPr>
+      <p:pic>
+        <p:nvPicPr>
+          <p:cNvPr id="2" name="DeepRob.pdf" descr="DeepRob.pdf"/>
+          <p:cNvPicPr>
+            <a:picLocks noChangeAspect="1"/>
+          </p:cNvPicPr>
+          <p:nvPr/>
+        </p:nvPicPr>
+        <p:blipFill>
+          <a:blip r:embed="rId2">
+            <a:extLst/>
+          </a:blip>
+          <a:stretch>
+            <a:fillRect/>
+          </a:stretch>
+        </p:blipFill>
+        <p:spPr>
+          <a:xfrm>
+            <a:off x="2168653" y="12602034"/>
+            <a:ext cx="3802215" cy="1079926"/>
+          </a:xfrm>
+          <a:prstGeom prst="rect">
+            <a:avLst/>
+          </a:prstGeom>
+          <a:ln w="12700">
+            <a:miter lim="400000"/>
+          </a:ln>
+        </p:spPr>
+      </p:pic>
+      <p:pic>
+        <p:nvPicPr>
+          <p:cNvPr id="3" name="UMich_favicon_light.png" descr="UMich_favicon_light.png"/>
+          <p:cNvPicPr>
+            <a:picLocks noChangeAspect="1"/>
+          </p:cNvPicPr>
+          <p:nvPr/>
+        </p:nvPicPr>
+        <p:blipFill>
+          <a:blip r:embed="rId3">
+            <a:extLst/>
+          </a:blip>
+          <a:stretch>
+            <a:fillRect/>
+          </a:stretch>
+        </p:blipFill>
+        <p:spPr>
+          <a:xfrm>
+            <a:off x="204455" y="179936"/>
+            <a:ext cx="1422401" cy="1422401"/>
+          </a:xfrm>
+          <a:prstGeom prst="rect">
+            <a:avLst/>
+          </a:prstGeom>
+          <a:ln w="12700">
+            <a:miter lim="400000"/>
+          </a:ln>
+        </p:spPr>
+      </p:pic>
       <p:sp>
         <p:nvSpPr>
-          <p:cNvPr id="2" name="Slide Number"/>
+          <p:cNvPr id="4" name="Slide Number"/>
           <p:cNvSpPr txBox="1"/>
           <p:nvPr>
             <p:ph type="sldNum" sz="quarter" idx="2"/>
@@ -1373,66 +1515,7 @@
       </p:sp>
       <p:pic>
         <p:nvPicPr>
-          <p:cNvPr id="3" name="Minn.png" descr="Minn.png"/>
-          <p:cNvPicPr>
-            <a:picLocks noChangeAspect="1"/>
-          </p:cNvPicPr>
-          <p:nvPr/>
-        </p:nvPicPr>
-        <p:blipFill>
-          <a:blip r:embed="rId2">
-            <a:extLst/>
-          </a:blip>
-          <a:srcRect l="29750" t="0" r="29750" b="60440"/>
-          <a:stretch>
-            <a:fillRect/>
-          </a:stretch>
-        </p:blipFill>
-        <p:spPr>
-          <a:xfrm>
-            <a:off x="2147907" y="12340118"/>
-            <a:ext cx="1686858" cy="1006419"/>
-          </a:xfrm>
-          <a:prstGeom prst="rect">
-            <a:avLst/>
-          </a:prstGeom>
-          <a:ln w="12700">
-            <a:miter lim="400000"/>
-          </a:ln>
-        </p:spPr>
-      </p:pic>
-      <p:pic>
-        <p:nvPicPr>
-          <p:cNvPr id="4" name="Image" descr="Image"/>
-          <p:cNvPicPr>
-            <a:picLocks noChangeAspect="1"/>
-          </p:cNvPicPr>
-          <p:nvPr/>
-        </p:nvPicPr>
-        <p:blipFill>
-          <a:blip r:embed="rId3">
-            <a:extLst/>
-          </a:blip>
-          <a:stretch>
-            <a:fillRect/>
-          </a:stretch>
-        </p:blipFill>
-        <p:spPr>
-          <a:xfrm>
-            <a:off x="211840" y="12340198"/>
-            <a:ext cx="1407630" cy="1006317"/>
-          </a:xfrm>
-          <a:prstGeom prst="rect">
-            <a:avLst/>
-          </a:prstGeom>
-          <a:ln w="12700">
-            <a:miter lim="400000"/>
-          </a:ln>
-        </p:spPr>
-      </p:pic>
-      <p:pic>
-        <p:nvPicPr>
-          <p:cNvPr id="5" name="favicon.png" descr="favicon.png"/>
+          <p:cNvPr id="5" name="Image" descr="Image"/>
           <p:cNvPicPr>
             <a:picLocks noChangeAspect="1"/>
           </p:cNvPicPr>
@@ -1448,8 +1531,8 @@
         </p:blipFill>
         <p:spPr>
           <a:xfrm>
-            <a:off x="195870" y="171403"/>
-            <a:ext cx="1439571" cy="1439572"/>
+            <a:off x="211840" y="12340198"/>
+            <a:ext cx="1407630" cy="1006317"/>
           </a:xfrm>
           <a:prstGeom prst="rect">
             <a:avLst/>
@@ -1474,7 +1557,7 @@
           </a:xfrm>
           <a:prstGeom prst="roundRect">
             <a:avLst>
-              <a:gd name="adj" fmla="val 15000"/>
+              <a:gd name="adj" fmla="val 8305"/>
             </a:avLst>
           </a:prstGeom>
           <a:solidFill>
@@ -1485,9 +1568,7 @@
           </a:ln>
           <a:effectLst>
             <a:outerShdw sx="100000" sy="100000" kx="0" ky="0" algn="b" rotWithShape="0" blurRad="1270000" dist="0" dir="5400000">
-              <a:srgbClr val="FC9B04">
-                <a:alpha val="90636"/>
-              </a:srgbClr>
+              <a:srgbClr val="DEB5FC"/>
             </a:outerShdw>
           </a:effectLst>
         </p:spPr>
@@ -1511,23 +1592,80 @@
       </p:sp>
       <p:sp>
         <p:nvSpPr>
-          <p:cNvPr id="7" name="DeepRob">
-            <a:hlinkClick r:id="rId5" invalidUrl="" action="" tgtFrame="" tooltip="" history="1" highlightClick="0" endSnd="0"/>
-          </p:cNvPr>
-          <p:cNvSpPr txBox="1"/>
+          <p:cNvPr id="7" name="Line"/>
+          <p:cNvSpPr/>
           <p:nvPr/>
         </p:nvSpPr>
         <p:spPr>
+          <a:xfrm flipV="1">
+            <a:off x="1891529" y="12395761"/>
+            <a:ext cx="5066" cy="895191"/>
+          </a:xfrm>
+          <a:prstGeom prst="line">
+            <a:avLst/>
+          </a:prstGeom>
+          <a:ln w="25400">
+            <a:solidFill>
+              <a:srgbClr val="00274C"/>
+            </a:solidFill>
+            <a:miter lim="400000"/>
+          </a:ln>
+        </p:spPr>
+        <p:txBody>
+          <a:bodyPr lIns="50800" tIns="50800" rIns="50800" bIns="50800" anchor="ctr"/>
+          <a:lstStyle/>
+          <a:p>
+            <a:pPr/>
+          </a:p>
+        </p:txBody>
+      </p:sp>
+      <p:pic>
+        <p:nvPicPr>
+          <p:cNvPr id="8" name="DeepRob.pdf" descr="DeepRob.pdf">
+            <a:hlinkClick r:id="rId6" invalidUrl="" action="" tgtFrame="" tooltip="" history="1" highlightClick="0" endSnd="0"/>
+          </p:cNvPr>
+          <p:cNvPicPr>
+            <a:picLocks noChangeAspect="1"/>
+          </p:cNvPicPr>
+          <p:nvPr/>
+        </p:nvPicPr>
+        <p:blipFill>
+          <a:blip r:embed="rId2">
+            <a:extLst/>
+          </a:blip>
+          <a:stretch>
+            <a:fillRect/>
+          </a:stretch>
+        </p:blipFill>
+        <p:spPr>
           <a:xfrm>
-            <a:off x="2263224" y="3876008"/>
-            <a:ext cx="11377506" cy="2131448"/>
+            <a:off x="2264057" y="4229143"/>
+            <a:ext cx="6746058" cy="1916052"/>
           </a:xfrm>
           <a:prstGeom prst="rect">
             <a:avLst/>
           </a:prstGeom>
-          <a:solidFill>
-            <a:srgbClr val="FFFFFF"/>
-          </a:solidFill>
+          <a:ln w="12700">
+            <a:miter lim="400000"/>
+          </a:ln>
+        </p:spPr>
+      </p:pic>
+      <p:sp>
+        <p:nvSpPr>
+          <p:cNvPr id="9" name="Title Text"/>
+          <p:cNvSpPr txBox="1"/>
+          <p:nvPr>
+            <p:ph type="title"/>
+          </p:nvPr>
+        </p:nvSpPr>
+        <p:spPr>
+          <a:xfrm>
+            <a:off x="1219200" y="549276"/>
+            <a:ext cx="21945600" cy="2286001"/>
+          </a:xfrm>
+          <a:prstGeom prst="rect">
+            <a:avLst/>
+          </a:prstGeom>
           <a:ln w="12700">
             <a:miter lim="400000"/>
           </a:ln>
@@ -1538,45 +1676,30 @@
           </a:extLst>
         </p:spPr>
         <p:txBody>
-          <a:bodyPr lIns="50800" tIns="50800" rIns="50800" bIns="50800" anchor="ctr">
+          <a:bodyPr lIns="91399" tIns="91399" rIns="91399" bIns="91399" anchor="ctr">
             <a:normAutofit fontScale="100000" lnSpcReduction="0"/>
           </a:bodyPr>
-          <a:lstStyle>
-            <a:lvl1pPr algn="l">
-              <a:lnSpc>
-                <a:spcPct val="80000"/>
-              </a:lnSpc>
-              <a:defRPr b="1" spc="-232" sz="11600">
-                <a:solidFill>
-                  <a:srgbClr val="000000"/>
-                </a:solidFill>
-                <a:latin typeface="Exo 2"/>
-                <a:ea typeface="Exo 2"/>
-                <a:cs typeface="Exo 2"/>
-                <a:sym typeface="Exo 2"/>
-              </a:defRPr>
-            </a:lvl1pPr>
-          </a:lstStyle>
+          <a:lstStyle/>
           <a:p>
             <a:pPr/>
             <a:r>
-              <a:t>DeepRob</a:t>
+              <a:t>Title Text</a:t>
             </a:r>
           </a:p>
         </p:txBody>
       </p:sp>
       <p:sp>
         <p:nvSpPr>
-          <p:cNvPr id="8" name="Title Text"/>
+          <p:cNvPr id="10" name="Body Level One…"/>
           <p:cNvSpPr txBox="1"/>
           <p:nvPr>
-            <p:ph type="title"/>
+            <p:ph type="body" idx="1"/>
           </p:nvPr>
         </p:nvSpPr>
         <p:spPr>
           <a:xfrm>
-            <a:off x="1219200" y="549276"/>
-            <a:ext cx="21945600" cy="2286001"/>
+            <a:off x="1219200" y="3200407"/>
+            <a:ext cx="21945600" cy="8896345"/>
           </a:xfrm>
           <a:prstGeom prst="rect">
             <a:avLst/>
@@ -1591,44 +1714,6 @@
           </a:extLst>
         </p:spPr>
         <p:txBody>
-          <a:bodyPr lIns="91399" tIns="91399" rIns="91399" bIns="91399" anchor="ctr">
-            <a:normAutofit fontScale="100000" lnSpcReduction="0"/>
-          </a:bodyPr>
-          <a:lstStyle/>
-          <a:p>
-            <a:pPr/>
-            <a:r>
-              <a:t>Title Text</a:t>
-            </a:r>
-          </a:p>
-        </p:txBody>
-      </p:sp>
-      <p:sp>
-        <p:nvSpPr>
-          <p:cNvPr id="9" name="Body Level One…"/>
-          <p:cNvSpPr txBox="1"/>
-          <p:nvPr>
-            <p:ph type="body" idx="1"/>
-          </p:nvPr>
-        </p:nvSpPr>
-        <p:spPr>
-          <a:xfrm>
-            <a:off x="1219200" y="3200407"/>
-            <a:ext cx="21945600" cy="8896345"/>
-          </a:xfrm>
-          <a:prstGeom prst="rect">
-            <a:avLst/>
-          </a:prstGeom>
-          <a:ln w="12700">
-            <a:miter lim="400000"/>
-          </a:ln>
-          <a:extLst>
-            <a:ext uri="{C572A759-6A51-4108-AA02-DFA0A04FC94B}">
-              <ma14:wrappingTextBoxFlag xmlns:ma14="http://schemas.microsoft.com/office/mac/drawingml/2011/main" val="1"/>
-            </a:ext>
-          </a:extLst>
-        </p:spPr>
-        <p:txBody>
           <a:bodyPr lIns="91399" tIns="91399" rIns="91399" bIns="91399">
             <a:normAutofit fontScale="100000" lnSpcReduction="0"/>
           </a:bodyPr>
@@ -1669,10 +1754,10 @@
   </p:cSld>
   <p:clrMap bg1="lt1" tx1="dk1" bg2="lt2" tx2="dk2" accent1="accent1" accent2="accent2" accent3="accent3" accent4="accent4" accent5="accent5" accent6="accent6" hlink="hlink" folHlink="folHlink"/>
   <p:sldLayoutIdLst>
-    <p:sldLayoutId id="2147483649" r:id="rId6"/>
-    <p:sldLayoutId id="2147483650" r:id="rId7"/>
-    <p:sldLayoutId id="2147483651" r:id="rId8"/>
-    <p:sldLayoutId id="2147483652" r:id="rId9"/>
+    <p:sldLayoutId id="2147483649" r:id="rId7"/>
+    <p:sldLayoutId id="2147483650" r:id="rId8"/>
+    <p:sldLayoutId id="2147483651" r:id="rId9"/>
+    <p:sldLayoutId id="2147483652" r:id="rId10"/>
   </p:sldLayoutIdLst>
   <p:transition xmlns:p14="http://schemas.microsoft.com/office/powerpoint/2010/main" spd="med" advClick="1"/>
   <p:txStyles>
@@ -2425,7 +2510,7 @@
       </p:grpSpPr>
       <p:sp>
         <p:nvSpPr>
-          <p:cNvPr id="63" name="Slide Number"/>
+          <p:cNvPr id="67" name="Slide Number"/>
           <p:cNvSpPr txBox="1"/>
           <p:nvPr>
             <p:ph type="sldNum" sz="quarter" idx="2"/>
@@ -2456,7 +2541,7 @@
       </p:sp>
       <p:sp>
         <p:nvSpPr>
-          <p:cNvPr id="64" name="Winter 2023…">
+          <p:cNvPr id="68" name="Winter 2023…">
             <a:hlinkClick r:id="rId2" invalidUrl="" action="" tgtFrame="" tooltip="" history="1" highlightClick="0" endSnd="0"/>
           </p:cNvPr>
           <p:cNvSpPr txBox="1"/>
@@ -2562,7 +2647,7 @@
       </p:grpSpPr>
       <p:sp>
         <p:nvSpPr>
-          <p:cNvPr id="107" name="Conclusions"/>
+          <p:cNvPr id="111" name="Conclusions"/>
           <p:cNvSpPr txBox="1"/>
           <p:nvPr>
             <p:ph type="title"/>
@@ -2586,7 +2671,7 @@
       </p:sp>
       <p:sp>
         <p:nvSpPr>
-          <p:cNvPr id="108" name="Summary of what was presented…"/>
+          <p:cNvPr id="112" name="Summary of what was presented…"/>
           <p:cNvSpPr txBox="1"/>
           <p:nvPr>
             <p:ph type="body" idx="1"/>
@@ -2634,7 +2719,7 @@
       </p:sp>
       <p:sp>
         <p:nvSpPr>
-          <p:cNvPr id="109" name="Slide Number"/>
+          <p:cNvPr id="113" name="Slide Number"/>
           <p:cNvSpPr txBox="1"/>
           <p:nvPr>
             <p:ph type="sldNum" sz="quarter" idx="2"/>
@@ -2687,7 +2772,7 @@
       </p:grpSpPr>
       <p:sp>
         <p:nvSpPr>
-          <p:cNvPr id="111" name="Limitations and Directions for Future Work"/>
+          <p:cNvPr id="115" name="Limitations and Directions for Future Work"/>
           <p:cNvSpPr txBox="1"/>
           <p:nvPr>
             <p:ph type="title"/>
@@ -2711,7 +2796,7 @@
       </p:sp>
       <p:sp>
         <p:nvSpPr>
-          <p:cNvPr id="112" name="Limitations…"/>
+          <p:cNvPr id="116" name="Limitations…"/>
           <p:cNvSpPr txBox="1"/>
           <p:nvPr>
             <p:ph type="body" idx="1"/>
@@ -2773,7 +2858,7 @@
       </p:sp>
       <p:sp>
         <p:nvSpPr>
-          <p:cNvPr id="113" name="Slide Number"/>
+          <p:cNvPr id="117" name="Slide Number"/>
           <p:cNvSpPr txBox="1"/>
           <p:nvPr>
             <p:ph type="sldNum" sz="quarter" idx="2"/>
@@ -2804,7 +2889,7 @@
       </p:sp>
       <p:sp>
         <p:nvSpPr>
-          <p:cNvPr id="114" name="Don’t forget to practice your slides to ensure you are near the desired 10-minute mark at this slide"/>
+          <p:cNvPr id="118" name="Don’t forget to practice your slides to ensure you are near the desired 10-minute mark at this slide"/>
           <p:cNvSpPr/>
           <p:nvPr/>
         </p:nvSpPr>
@@ -2881,7 +2966,7 @@
       </p:grpSpPr>
       <p:sp>
         <p:nvSpPr>
-          <p:cNvPr id="66" name="Slide Number"/>
+          <p:cNvPr id="70" name="Slide Number"/>
           <p:cNvSpPr txBox="1"/>
           <p:nvPr>
             <p:ph type="sldNum" sz="quarter" idx="2"/>
@@ -2912,7 +2997,7 @@
       </p:sp>
       <p:sp>
         <p:nvSpPr>
-          <p:cNvPr id="67" name="Presented by:"/>
+          <p:cNvPr id="71" name="Presented by:"/>
           <p:cNvSpPr txBox="1"/>
           <p:nvPr>
             <p:ph type="body" idx="22"/>
@@ -2949,7 +3034,7 @@
       </p:sp>
       <p:sp>
         <p:nvSpPr>
-          <p:cNvPr id="68" name="First Student, Second Student, Third Student"/>
+          <p:cNvPr id="72" name="First Student, Second Student, Third Student"/>
           <p:cNvSpPr txBox="1"/>
           <p:nvPr/>
         </p:nvSpPr>
@@ -3000,7 +3085,7 @@
       </p:sp>
       <p:sp>
         <p:nvSpPr>
-          <p:cNvPr id="69" name="Fourth Student, Fifth Student, Sixth Student"/>
+          <p:cNvPr id="73" name="Fourth Student, Fifth Student, Sixth Student"/>
           <p:cNvSpPr txBox="1"/>
           <p:nvPr/>
         </p:nvSpPr>
@@ -3051,7 +3136,7 @@
       </p:sp>
       <p:sp>
         <p:nvSpPr>
-          <p:cNvPr id="70" name="By:"/>
+          <p:cNvPr id="74" name="By:"/>
           <p:cNvSpPr txBox="1"/>
           <p:nvPr/>
         </p:nvSpPr>
@@ -3102,7 +3187,7 @@
       </p:sp>
       <p:sp>
         <p:nvSpPr>
-          <p:cNvPr id="71" name="Paper Title"/>
+          <p:cNvPr id="75" name="Paper Title"/>
           <p:cNvSpPr txBox="1"/>
           <p:nvPr/>
         </p:nvSpPr>
@@ -3153,7 +3238,7 @@
       </p:sp>
       <p:sp>
         <p:nvSpPr>
-          <p:cNvPr id="72" name="Paper subtitled (if it has one)"/>
+          <p:cNvPr id="76" name="Paper subtitled (if it has one)"/>
           <p:cNvSpPr txBox="1"/>
           <p:nvPr/>
         </p:nvSpPr>
@@ -3204,7 +3289,7 @@
       </p:sp>
       <p:sp>
         <p:nvSpPr>
-          <p:cNvPr id="73" name="First Author, Second Author, Third Author, Fourth Author, Fifth Author"/>
+          <p:cNvPr id="77" name="First Author, Second Author, Third Author, Fourth Author, Fifth Author"/>
           <p:cNvSpPr txBox="1"/>
           <p:nvPr/>
         </p:nvSpPr>
@@ -3255,7 +3340,7 @@
       </p:sp>
       <p:sp>
         <p:nvSpPr>
-          <p:cNvPr id="74" name="Sixth Author, Seventh Author, Eighth Author, Tenth Author, Eleventh Author"/>
+          <p:cNvPr id="78" name="Sixth Author, Seventh Author, Eighth Author, Tenth Author, Eleventh Author"/>
           <p:cNvSpPr txBox="1"/>
           <p:nvPr/>
         </p:nvSpPr>
@@ -3332,7 +3417,7 @@
       </p:grpSpPr>
       <p:sp>
         <p:nvSpPr>
-          <p:cNvPr id="76" name="Hot Start (change your slide title)"/>
+          <p:cNvPr id="80" name="Hot Start (change your slide title)"/>
           <p:cNvSpPr txBox="1"/>
           <p:nvPr>
             <p:ph type="title"/>
@@ -3356,7 +3441,7 @@
       </p:sp>
       <p:sp>
         <p:nvSpPr>
-          <p:cNvPr id="77" name="Slide Number"/>
+          <p:cNvPr id="81" name="Slide Number"/>
           <p:cNvSpPr txBox="1"/>
           <p:nvPr>
             <p:ph type="sldNum" sz="quarter" idx="2"/>
@@ -3387,7 +3472,7 @@
       </p:sp>
       <p:sp>
         <p:nvSpPr>
-          <p:cNvPr id="78" name="Consider this a skeleton for your final project presentations"/>
+          <p:cNvPr id="82" name="Consider this a skeleton for your final project presentations"/>
           <p:cNvSpPr/>
           <p:nvPr/>
         </p:nvSpPr>
@@ -3434,7 +3519,7 @@
       </p:sp>
       <p:sp>
         <p:nvSpPr>
-          <p:cNvPr id="79" name="You can reorder, remove, or add sections but the audience should leave with an understanding of your paper in each of the categories on the following slides"/>
+          <p:cNvPr id="83" name="You can reorder, remove, or add sections but the audience should leave with an understanding of your paper in each of the categories on the following slides"/>
           <p:cNvSpPr/>
           <p:nvPr/>
         </p:nvSpPr>
@@ -3481,13 +3566,13 @@
       </p:sp>
       <p:sp>
         <p:nvSpPr>
-          <p:cNvPr id="80" name="Important advice: when adding any text or figures to slides, always consider how large the text needs to be for it to be readable by the most distant audience member"/>
+          <p:cNvPr id="84" name="Important advice: when adding any text or figures to slides, always consider how large the text needs to be for it to be readable by the most distant audience member"/>
           <p:cNvSpPr/>
           <p:nvPr/>
         </p:nvSpPr>
         <p:spPr>
           <a:xfrm>
-            <a:off x="3073989" y="9789949"/>
+            <a:off x="3073989" y="9789948"/>
             <a:ext cx="18236022" cy="1601976"/>
           </a:xfrm>
           <a:prstGeom prst="roundRect">
@@ -3534,7 +3619,7 @@
       </p:sp>
       <p:sp>
         <p:nvSpPr>
-          <p:cNvPr id="81" name="Creating more interesting slide titles is also recommended"/>
+          <p:cNvPr id="85" name="Creating more interesting slide titles is also recommended"/>
           <p:cNvSpPr/>
           <p:nvPr/>
         </p:nvSpPr>
@@ -3607,7 +3692,7 @@
       </p:grpSpPr>
       <p:sp>
         <p:nvSpPr>
-          <p:cNvPr id="83" name="The Authors"/>
+          <p:cNvPr id="87" name="The Authors"/>
           <p:cNvSpPr txBox="1"/>
           <p:nvPr>
             <p:ph type="title"/>
@@ -3631,7 +3716,7 @@
       </p:sp>
       <p:sp>
         <p:nvSpPr>
-          <p:cNvPr id="84" name="First Author…"/>
+          <p:cNvPr id="88" name="First Author…"/>
           <p:cNvSpPr txBox="1"/>
           <p:nvPr>
             <p:ph type="body" idx="1"/>
@@ -3717,7 +3802,7 @@
       </p:sp>
       <p:sp>
         <p:nvSpPr>
-          <p:cNvPr id="85" name="Slide Number"/>
+          <p:cNvPr id="89" name="Slide Number"/>
           <p:cNvSpPr txBox="1"/>
           <p:nvPr>
             <p:ph type="sldNum" sz="quarter" idx="2"/>
@@ -3774,7 +3859,7 @@
       </p:grpSpPr>
       <p:sp>
         <p:nvSpPr>
-          <p:cNvPr id="87" name="Value Proposition (change your slide title)"/>
+          <p:cNvPr id="91" name="Value Proposition (change your slide title)"/>
           <p:cNvSpPr txBox="1"/>
           <p:nvPr>
             <p:ph type="title"/>
@@ -3798,7 +3883,7 @@
       </p:sp>
       <p:sp>
         <p:nvSpPr>
-          <p:cNvPr id="88" name="Background on what problem the paper sets out to address…"/>
+          <p:cNvPr id="92" name="Background on what problem the paper sets out to address…"/>
           <p:cNvSpPr txBox="1"/>
           <p:nvPr>
             <p:ph type="body" idx="1"/>
@@ -3840,7 +3925,7 @@
       </p:sp>
       <p:sp>
         <p:nvSpPr>
-          <p:cNvPr id="89" name="Slide Number"/>
+          <p:cNvPr id="93" name="Slide Number"/>
           <p:cNvSpPr txBox="1"/>
           <p:nvPr>
             <p:ph type="sldNum" sz="quarter" idx="2"/>
@@ -3897,7 +3982,7 @@
       </p:grpSpPr>
       <p:sp>
         <p:nvSpPr>
-          <p:cNvPr id="91" name="Contributions"/>
+          <p:cNvPr id="95" name="Contributions"/>
           <p:cNvSpPr txBox="1"/>
           <p:nvPr>
             <p:ph type="title"/>
@@ -3921,7 +4006,7 @@
       </p:sp>
       <p:sp>
         <p:nvSpPr>
-          <p:cNvPr id="92" name="First Contribution…"/>
+          <p:cNvPr id="96" name="First Contribution…"/>
           <p:cNvSpPr txBox="1"/>
           <p:nvPr>
             <p:ph type="body" idx="1"/>
@@ -4029,7 +4114,7 @@
       </p:sp>
       <p:sp>
         <p:nvSpPr>
-          <p:cNvPr id="93" name="Slide Number"/>
+          <p:cNvPr id="97" name="Slide Number"/>
           <p:cNvSpPr txBox="1"/>
           <p:nvPr>
             <p:ph type="sldNum" sz="quarter" idx="2"/>
@@ -4086,7 +4171,7 @@
       </p:grpSpPr>
       <p:sp>
         <p:nvSpPr>
-          <p:cNvPr id="95" name="Background"/>
+          <p:cNvPr id="99" name="Background"/>
           <p:cNvSpPr txBox="1"/>
           <p:nvPr>
             <p:ph type="title"/>
@@ -4110,7 +4195,7 @@
       </p:sp>
       <p:sp>
         <p:nvSpPr>
-          <p:cNvPr id="96" name="What has made the problem difficult in the past?…"/>
+          <p:cNvPr id="100" name="What has made the problem difficult in the past?…"/>
           <p:cNvSpPr txBox="1"/>
           <p:nvPr>
             <p:ph type="body" idx="1"/>
@@ -4154,7 +4239,7 @@
       </p:sp>
       <p:sp>
         <p:nvSpPr>
-          <p:cNvPr id="97" name="Slide Number"/>
+          <p:cNvPr id="101" name="Slide Number"/>
           <p:cNvSpPr txBox="1"/>
           <p:nvPr>
             <p:ph type="sldNum" sz="quarter" idx="2"/>
@@ -4211,7 +4296,7 @@
       </p:grpSpPr>
       <p:sp>
         <p:nvSpPr>
-          <p:cNvPr id="99" name="Approach"/>
+          <p:cNvPr id="103" name="Approach"/>
           <p:cNvSpPr txBox="1"/>
           <p:nvPr>
             <p:ph type="title"/>
@@ -4235,7 +4320,7 @@
       </p:sp>
       <p:sp>
         <p:nvSpPr>
-          <p:cNvPr id="100" name="What is the key technical insight of this paper?…"/>
+          <p:cNvPr id="104" name="What is the key technical insight of this paper?…"/>
           <p:cNvSpPr txBox="1"/>
           <p:nvPr>
             <p:ph type="body" idx="1"/>
@@ -4269,7 +4354,7 @@
       </p:sp>
       <p:sp>
         <p:nvSpPr>
-          <p:cNvPr id="101" name="Slide Number"/>
+          <p:cNvPr id="105" name="Slide Number"/>
           <p:cNvSpPr txBox="1"/>
           <p:nvPr>
             <p:ph type="sldNum" sz="quarter" idx="2"/>
@@ -4326,7 +4411,7 @@
       </p:grpSpPr>
       <p:sp>
         <p:nvSpPr>
-          <p:cNvPr id="103" name="Results"/>
+          <p:cNvPr id="107" name="Results"/>
           <p:cNvSpPr txBox="1"/>
           <p:nvPr>
             <p:ph type="title"/>
@@ -4350,7 +4435,7 @@
       </p:sp>
       <p:sp>
         <p:nvSpPr>
-          <p:cNvPr id="104" name="How was the proposed approach analyzed?…"/>
+          <p:cNvPr id="108" name="How was the proposed approach analyzed?…"/>
           <p:cNvSpPr txBox="1"/>
           <p:nvPr>
             <p:ph type="body" idx="1"/>
@@ -4393,7 +4478,7 @@
       </p:sp>
       <p:sp>
         <p:nvSpPr>
-          <p:cNvPr id="105" name="Slide Number"/>
+          <p:cNvPr id="109" name="Slide Number"/>
           <p:cNvSpPr txBox="1"/>
           <p:nvPr>
             <p:ph type="sldNum" sz="quarter" idx="2"/>

</xml_diff>